<commit_message>
ethics slide for coaching.pptx
</commit_message>
<xml_diff>
--- a/spring14/slidesS14/coaching.pptx
+++ b/spring14/slidesS14/coaching.pptx
@@ -5,10 +5,10 @@
     <p:sldMasterId id="2147483650" r:id="rId1"/>
   </p:sldMasterIdLst>
   <p:notesMasterIdLst>
-    <p:notesMasterId r:id="rId34"/>
+    <p:notesMasterId r:id="rId35"/>
   </p:notesMasterIdLst>
   <p:handoutMasterIdLst>
-    <p:handoutMasterId r:id="rId35"/>
+    <p:handoutMasterId r:id="rId36"/>
   </p:handoutMasterIdLst>
   <p:sldIdLst>
     <p:sldId id="392" r:id="rId2"/>
@@ -43,11 +43,12 @@
     <p:sldId id="420" r:id="rId31"/>
     <p:sldId id="426" r:id="rId32"/>
     <p:sldId id="427" r:id="rId33"/>
+    <p:sldId id="428" r:id="rId34"/>
   </p:sldIdLst>
   <p:sldSz cx="9144000" cy="6858000" type="screen4x3"/>
   <p:notesSz cx="9601200" cy="7315200"/>
   <p:custDataLst>
-    <p:tags r:id="rId37"/>
+    <p:tags r:id="rId38"/>
   </p:custDataLst>
   <p:defaultTextStyle>
     <a:defPPr>
@@ -9153,17 +9154,7 @@
                   </a:schemeClr>
                 </a:solidFill>
               </a:rPr>
-              <a:t>looked at all the student material and staff </a:t>
-            </a:r>
-            <a:r>
-              <a:rPr lang="en-US" sz="4400" dirty="0" smtClean="0">
-                <a:solidFill>
-                  <a:schemeClr val="accent5">
-                    <a:lumMod val="50000"/>
-                  </a:schemeClr>
-                </a:solidFill>
-              </a:rPr>
-              <a:t>solutions</a:t>
+              <a:t>looked at all the student material and staff solutions</a:t>
             </a:r>
             <a:r>
               <a:rPr lang="en-US" sz="4400" dirty="0" smtClean="0"/>
@@ -9183,15 +9174,7 @@
                   <a:srgbClr val="0000F1"/>
                 </a:solidFill>
               </a:rPr>
-              <a:t>advance about </a:t>
-            </a:r>
-            <a:r>
-              <a:rPr lang="en-US" sz="4400" dirty="0" smtClean="0">
-                <a:solidFill>
-                  <a:srgbClr val="0000F1"/>
-                </a:solidFill>
-              </a:rPr>
-              <a:t>anything you’re not sure of</a:t>
+              <a:t>advance about anything you’re not sure of</a:t>
             </a:r>
             <a:r>
               <a:rPr lang="en-US" sz="4400" dirty="0" smtClean="0"/>
@@ -9328,41 +9311,13 @@
           <a:p>
             <a:r>
               <a:rPr lang="en-US" sz="4400" dirty="0" smtClean="0"/>
-              <a:t>Most students </a:t>
-            </a:r>
+              <a:t>Most students appreciate the guidance of their coaches.  Many are former students who want to return the favor.</a:t>
+            </a:r>
+          </a:p>
+          <a:p>
             <a:r>
               <a:rPr lang="en-US" sz="4400" dirty="0" smtClean="0"/>
-              <a:t>appreciate the </a:t>
-            </a:r>
-            <a:r>
-              <a:rPr lang="en-US" sz="4400" dirty="0" smtClean="0"/>
-              <a:t>guidance </a:t>
-            </a:r>
-            <a:r>
-              <a:rPr lang="en-US" sz="4400" dirty="0" smtClean="0"/>
-              <a:t>of their coaches.  Many </a:t>
-            </a:r>
-            <a:r>
-              <a:rPr lang="en-US" sz="4400" dirty="0" smtClean="0"/>
-              <a:t>are </a:t>
-            </a:r>
-            <a:r>
-              <a:rPr lang="en-US" sz="4400" dirty="0" smtClean="0"/>
-              <a:t>former students who want to return the </a:t>
-            </a:r>
-            <a:r>
-              <a:rPr lang="en-US" sz="4400" dirty="0" smtClean="0"/>
-              <a:t>favor.</a:t>
-            </a:r>
-          </a:p>
-          <a:p>
-            <a:r>
-              <a:rPr lang="en-US" sz="4400" dirty="0" smtClean="0"/>
-              <a:t>It’s </a:t>
-            </a:r>
-            <a:r>
-              <a:rPr lang="en-US" sz="4400" dirty="0" smtClean="0"/>
-              <a:t>a satisfying role and a way to gain valuable leadership and communication skills.</a:t>
+              <a:t>It’s a satisfying role and a way to gain valuable leadership and communication skills.</a:t>
             </a:r>
             <a:endParaRPr lang="en-US" sz="4400" dirty="0"/>
           </a:p>
@@ -9469,6 +9424,436 @@
                                           <p:spTgt spid="3">
                                             <p:txEl>
                                               <p:pRg st="1" end="1"/>
+                                            </p:txEl>
+                                          </p:spTgt>
+                                        </p:tgtEl>
+                                      </p:cBhvr>
+                                    </p:animEffect>
+                                  </p:childTnLst>
+                                </p:cTn>
+                              </p:par>
+                            </p:childTnLst>
+                          </p:cTn>
+                        </p:par>
+                      </p:childTnLst>
+                    </p:cTn>
+                  </p:par>
+                </p:childTnLst>
+              </p:cTn>
+              <p:prevCondLst>
+                <p:cond evt="onPrev" delay="0">
+                  <p:tgtEl>
+                    <p:sldTgt/>
+                  </p:tgtEl>
+                </p:cond>
+              </p:prevCondLst>
+              <p:nextCondLst>
+                <p:cond evt="onNext" delay="0">
+                  <p:tgtEl>
+                    <p:sldTgt/>
+                  </p:tgtEl>
+                </p:cond>
+              </p:nextCondLst>
+            </p:seq>
+          </p:childTnLst>
+        </p:cTn>
+      </p:par>
+    </p:tnLst>
+  </p:timing>
+</p:sld>
+</file>
+
+<file path=ppt/slides/slide33.xml><?xml version="1.0" encoding="utf-8"?>
+<p:sld xmlns:a="http://schemas.openxmlformats.org/drawingml/2006/main" xmlns:r="http://schemas.openxmlformats.org/officeDocument/2006/relationships" xmlns:p="http://schemas.openxmlformats.org/presentationml/2006/main">
+  <p:cSld>
+    <p:spTree>
+      <p:nvGrpSpPr>
+        <p:cNvPr id="1" name=""/>
+        <p:cNvGrpSpPr/>
+        <p:nvPr/>
+      </p:nvGrpSpPr>
+      <p:grpSpPr>
+        <a:xfrm>
+          <a:off x="0" y="0"/>
+          <a:ext cx="0" cy="0"/>
+          <a:chOff x="0" y="0"/>
+          <a:chExt cx="0" cy="0"/>
+        </a:xfrm>
+      </p:grpSpPr>
+      <p:sp>
+        <p:nvSpPr>
+          <p:cNvPr id="2" name="Title 1"/>
+          <p:cNvSpPr>
+            <a:spLocks noGrp="1"/>
+          </p:cNvSpPr>
+          <p:nvPr>
+            <p:ph type="title"/>
+          </p:nvPr>
+        </p:nvSpPr>
+        <p:spPr/>
+        <p:txBody>
+          <a:bodyPr/>
+          <a:lstStyle/>
+          <a:p>
+            <a:r>
+              <a:rPr lang="en-US" sz="4000" dirty="0" smtClean="0"/>
+              <a:t>And it should go w/o saying</a:t>
+            </a:r>
+            <a:endParaRPr lang="en-US" sz="4000" dirty="0"/>
+          </a:p>
+        </p:txBody>
+      </p:sp>
+      <p:sp>
+        <p:nvSpPr>
+          <p:cNvPr id="3" name="Content Placeholder 2"/>
+          <p:cNvSpPr>
+            <a:spLocks noGrp="1"/>
+          </p:cNvSpPr>
+          <p:nvPr>
+            <p:ph idx="1"/>
+          </p:nvPr>
+        </p:nvSpPr>
+        <p:spPr>
+          <a:xfrm>
+            <a:off x="703262" y="1447800"/>
+            <a:ext cx="8097837" cy="4737100"/>
+          </a:xfrm>
+        </p:spPr>
+        <p:txBody>
+          <a:bodyPr/>
+          <a:lstStyle/>
+          <a:p>
+            <a:r>
+              <a:rPr lang="en-US" dirty="0" smtClean="0"/>
+              <a:t>You are in a supervisory position, perhaps for the first time.  Do not abuse it.  For example, </a:t>
+            </a:r>
+          </a:p>
+          <a:p>
+            <a:pPr marL="571500" indent="-571500">
+              <a:buFont typeface="Arial"/>
+              <a:buChar char="•"/>
+            </a:pPr>
+            <a:r>
+              <a:rPr lang="en-US" dirty="0" smtClean="0"/>
+              <a:t>no personal relationships with team members</a:t>
+            </a:r>
+          </a:p>
+          <a:p>
+            <a:pPr marL="571500" indent="-571500">
+              <a:buFont typeface="Arial"/>
+              <a:buChar char="•"/>
+            </a:pPr>
+            <a:r>
+              <a:rPr lang="en-US" dirty="0" smtClean="0"/>
+              <a:t>no bribes</a:t>
+            </a:r>
+          </a:p>
+          <a:p>
+            <a:pPr marL="571500" indent="-571500">
+              <a:buFont typeface="Arial"/>
+              <a:buChar char="•"/>
+            </a:pPr>
+            <a:r>
+              <a:rPr lang="en-US" dirty="0" smtClean="0"/>
+              <a:t>no undeserved “hardship” grading</a:t>
+            </a:r>
+            <a:endParaRPr lang="en-US" dirty="0"/>
+          </a:p>
+        </p:txBody>
+      </p:sp>
+      <p:sp>
+        <p:nvSpPr>
+          <p:cNvPr id="4" name="Slide Number Placeholder 3"/>
+          <p:cNvSpPr>
+            <a:spLocks noGrp="1"/>
+          </p:cNvSpPr>
+          <p:nvPr>
+            <p:ph type="sldNum" sz="quarter" idx="4"/>
+          </p:nvPr>
+        </p:nvSpPr>
+        <p:spPr/>
+        <p:txBody>
+          <a:bodyPr/>
+          <a:lstStyle/>
+          <a:p>
+            <a:pPr>
+              <a:defRPr/>
+            </a:pPr>
+            <a:r>
+              <a:rPr lang="en-US" smtClean="0"/>
+              <a:t>coaching.</a:t>
+            </a:r>
+            <a:fld id="{EBFB97A3-F52F-4FD6-B1AC-522A20C95467}" type="slidenum">
+              <a:rPr lang="en-US" smtClean="0"/>
+              <a:pPr>
+                <a:defRPr/>
+              </a:pPr>
+              <a:t>33</a:t>
+            </a:fld>
+            <a:endParaRPr lang="en-US" dirty="0"/>
+          </a:p>
+        </p:txBody>
+      </p:sp>
+    </p:spTree>
+    <p:extLst>
+      <p:ext uri="{BB962C8B-B14F-4D97-AF65-F5344CB8AC3E}">
+        <p14:creationId xmlns:p14="http://schemas.microsoft.com/office/powerpoint/2010/main" val="687863046"/>
+      </p:ext>
+    </p:extLst>
+  </p:cSld>
+  <p:clrMapOvr>
+    <a:masterClrMapping/>
+  </p:clrMapOvr>
+  <mc:AlternateContent xmlns:mc="http://schemas.openxmlformats.org/markup-compatibility/2006" xmlns:p14="http://schemas.microsoft.com/office/powerpoint/2010/main">
+    <mc:Choice Requires="p14">
+      <p:transition spd="slow" p14:dur="900" advClick="0">
+        <p:fade/>
+      </p:transition>
+    </mc:Choice>
+    <mc:Fallback xmlns="">
+      <p:transition xmlns:p14="http://schemas.microsoft.com/office/powerpoint/2010/main" spd="slow" advClick="0">
+        <p:fade/>
+      </p:transition>
+    </mc:Fallback>
+  </mc:AlternateContent>
+  <p:timing>
+    <p:tnLst>
+      <p:par>
+        <p:cTn xmlns:p14="http://schemas.microsoft.com/office/powerpoint/2010/main" id="1" dur="indefinite" restart="never" nodeType="tmRoot">
+          <p:childTnLst>
+            <p:seq concurrent="1" nextAc="seek">
+              <p:cTn id="2" dur="indefinite" nodeType="mainSeq">
+                <p:childTnLst>
+                  <p:par>
+                    <p:cTn id="3" fill="hold">
+                      <p:stCondLst>
+                        <p:cond delay="indefinite"/>
+                      </p:stCondLst>
+                      <p:childTnLst>
+                        <p:par>
+                          <p:cTn id="4" fill="hold">
+                            <p:stCondLst>
+                              <p:cond delay="0"/>
+                            </p:stCondLst>
+                            <p:childTnLst>
+                              <p:par>
+                                <p:cTn id="5" presetID="10" presetClass="entr" presetSubtype="0" fill="hold" nodeType="clickEffect">
+                                  <p:stCondLst>
+                                    <p:cond delay="0"/>
+                                  </p:stCondLst>
+                                  <p:childTnLst>
+                                    <p:set>
+                                      <p:cBhvr>
+                                        <p:cTn id="6" dur="1" fill="hold">
+                                          <p:stCondLst>
+                                            <p:cond delay="0"/>
+                                          </p:stCondLst>
+                                        </p:cTn>
+                                        <p:tgtEl>
+                                          <p:spTgt spid="3">
+                                            <p:txEl>
+                                              <p:pRg st="0" end="0"/>
+                                            </p:txEl>
+                                          </p:spTgt>
+                                        </p:tgtEl>
+                                        <p:attrNameLst>
+                                          <p:attrName>style.visibility</p:attrName>
+                                        </p:attrNameLst>
+                                      </p:cBhvr>
+                                      <p:to>
+                                        <p:strVal val="visible"/>
+                                      </p:to>
+                                    </p:set>
+                                    <p:animEffect transition="in" filter="fade">
+                                      <p:cBhvr>
+                                        <p:cTn id="7" dur="500"/>
+                                        <p:tgtEl>
+                                          <p:spTgt spid="3">
+                                            <p:txEl>
+                                              <p:pRg st="0" end="0"/>
+                                            </p:txEl>
+                                          </p:spTgt>
+                                        </p:tgtEl>
+                                      </p:cBhvr>
+                                    </p:animEffect>
+                                  </p:childTnLst>
+                                </p:cTn>
+                              </p:par>
+                            </p:childTnLst>
+                          </p:cTn>
+                        </p:par>
+                      </p:childTnLst>
+                    </p:cTn>
+                  </p:par>
+                  <p:par>
+                    <p:cTn id="8" fill="hold">
+                      <p:stCondLst>
+                        <p:cond delay="indefinite"/>
+                      </p:stCondLst>
+                      <p:childTnLst>
+                        <p:par>
+                          <p:cTn id="9" fill="hold">
+                            <p:stCondLst>
+                              <p:cond delay="0"/>
+                            </p:stCondLst>
+                            <p:childTnLst>
+                              <p:par>
+                                <p:cTn id="10" presetID="10" presetClass="entr" presetSubtype="0" fill="hold" nodeType="clickEffect">
+                                  <p:stCondLst>
+                                    <p:cond delay="0"/>
+                                  </p:stCondLst>
+                                  <p:childTnLst>
+                                    <p:set>
+                                      <p:cBhvr>
+                                        <p:cTn id="11" dur="1" fill="hold">
+                                          <p:stCondLst>
+                                            <p:cond delay="0"/>
+                                          </p:stCondLst>
+                                        </p:cTn>
+                                        <p:tgtEl>
+                                          <p:spTgt spid="3">
+                                            <p:txEl>
+                                              <p:pRg st="1" end="1"/>
+                                            </p:txEl>
+                                          </p:spTgt>
+                                        </p:tgtEl>
+                                        <p:attrNameLst>
+                                          <p:attrName>style.visibility</p:attrName>
+                                        </p:attrNameLst>
+                                      </p:cBhvr>
+                                      <p:to>
+                                        <p:strVal val="visible"/>
+                                      </p:to>
+                                    </p:set>
+                                    <p:animEffect transition="in" filter="fade">
+                                      <p:cBhvr>
+                                        <p:cTn id="12" dur="500"/>
+                                        <p:tgtEl>
+                                          <p:spTgt spid="3">
+                                            <p:txEl>
+                                              <p:pRg st="1" end="1"/>
+                                            </p:txEl>
+                                          </p:spTgt>
+                                        </p:tgtEl>
+                                      </p:cBhvr>
+                                    </p:animEffect>
+                                  </p:childTnLst>
+                                </p:cTn>
+                              </p:par>
+                            </p:childTnLst>
+                          </p:cTn>
+                        </p:par>
+                      </p:childTnLst>
+                    </p:cTn>
+                  </p:par>
+                  <p:par>
+                    <p:cTn id="13" fill="hold">
+                      <p:stCondLst>
+                        <p:cond delay="indefinite"/>
+                      </p:stCondLst>
+                      <p:childTnLst>
+                        <p:par>
+                          <p:cTn id="14" fill="hold">
+                            <p:stCondLst>
+                              <p:cond delay="0"/>
+                            </p:stCondLst>
+                            <p:childTnLst>
+                              <p:par>
+                                <p:cTn id="15" presetID="10" presetClass="entr" presetSubtype="0" fill="hold" nodeType="clickEffect">
+                                  <p:stCondLst>
+                                    <p:cond delay="0"/>
+                                  </p:stCondLst>
+                                  <p:childTnLst>
+                                    <p:set>
+                                      <p:cBhvr>
+                                        <p:cTn id="16" dur="1" fill="hold">
+                                          <p:stCondLst>
+                                            <p:cond delay="0"/>
+                                          </p:stCondLst>
+                                        </p:cTn>
+                                        <p:tgtEl>
+                                          <p:spTgt spid="3">
+                                            <p:txEl>
+                                              <p:pRg st="2" end="2"/>
+                                            </p:txEl>
+                                          </p:spTgt>
+                                        </p:tgtEl>
+                                        <p:attrNameLst>
+                                          <p:attrName>style.visibility</p:attrName>
+                                        </p:attrNameLst>
+                                      </p:cBhvr>
+                                      <p:to>
+                                        <p:strVal val="visible"/>
+                                      </p:to>
+                                    </p:set>
+                                    <p:animEffect transition="in" filter="fade">
+                                      <p:cBhvr>
+                                        <p:cTn id="17" dur="500"/>
+                                        <p:tgtEl>
+                                          <p:spTgt spid="3">
+                                            <p:txEl>
+                                              <p:pRg st="2" end="2"/>
+                                            </p:txEl>
+                                          </p:spTgt>
+                                        </p:tgtEl>
+                                      </p:cBhvr>
+                                    </p:animEffect>
+                                  </p:childTnLst>
+                                </p:cTn>
+                              </p:par>
+                            </p:childTnLst>
+                          </p:cTn>
+                        </p:par>
+                      </p:childTnLst>
+                    </p:cTn>
+                  </p:par>
+                  <p:par>
+                    <p:cTn id="18" fill="hold">
+                      <p:stCondLst>
+                        <p:cond delay="indefinite"/>
+                      </p:stCondLst>
+                      <p:childTnLst>
+                        <p:par>
+                          <p:cTn id="19" fill="hold">
+                            <p:stCondLst>
+                              <p:cond delay="0"/>
+                            </p:stCondLst>
+                            <p:childTnLst>
+                              <p:par>
+                                <p:cTn id="20" presetID="10" presetClass="entr" presetSubtype="0" fill="hold" nodeType="clickEffect">
+                                  <p:stCondLst>
+                                    <p:cond delay="0"/>
+                                  </p:stCondLst>
+                                  <p:childTnLst>
+                                    <p:set>
+                                      <p:cBhvr>
+                                        <p:cTn id="21" dur="1" fill="hold">
+                                          <p:stCondLst>
+                                            <p:cond delay="0"/>
+                                          </p:stCondLst>
+                                        </p:cTn>
+                                        <p:tgtEl>
+                                          <p:spTgt spid="3">
+                                            <p:txEl>
+                                              <p:pRg st="3" end="3"/>
+                                            </p:txEl>
+                                          </p:spTgt>
+                                        </p:tgtEl>
+                                        <p:attrNameLst>
+                                          <p:attrName>style.visibility</p:attrName>
+                                        </p:attrNameLst>
+                                      </p:cBhvr>
+                                      <p:to>
+                                        <p:strVal val="visible"/>
+                                      </p:to>
+                                    </p:set>
+                                    <p:animEffect transition="in" filter="fade">
+                                      <p:cBhvr>
+                                        <p:cTn id="22" dur="500"/>
+                                        <p:tgtEl>
+                                          <p:spTgt spid="3">
+                                            <p:txEl>
+                                              <p:pRg st="3" end="3"/>
                                             </p:txEl>
                                           </p:spTgt>
                                         </p:tgtEl>

</xml_diff>